<commit_message>
minor updates as part of first revision
</commit_message>
<xml_diff>
--- a/tests/figs/study_araa/Fig-map.pptx
+++ b/tests/figs/study_araa/Fig-map.pptx
@@ -243,7 +243,7 @@
           <a:p>
             <a:fld id="{E384D03E-D0E3-7F45-A2BA-7784890EFA33}" type="datetimeFigureOut">
               <a:rPr lang="en-US" smtClean="0"/>
-              <a:t>10/27/22</a:t>
+              <a:t>2/14/23</a:t>
             </a:fld>
             <a:endParaRPr lang="en-US"/>
           </a:p>
@@ -413,7 +413,7 @@
           <a:p>
             <a:fld id="{E384D03E-D0E3-7F45-A2BA-7784890EFA33}" type="datetimeFigureOut">
               <a:rPr lang="en-US" smtClean="0"/>
-              <a:t>10/27/22</a:t>
+              <a:t>2/14/23</a:t>
             </a:fld>
             <a:endParaRPr lang="en-US"/>
           </a:p>
@@ -593,7 +593,7 @@
           <a:p>
             <a:fld id="{E384D03E-D0E3-7F45-A2BA-7784890EFA33}" type="datetimeFigureOut">
               <a:rPr lang="en-US" smtClean="0"/>
-              <a:t>10/27/22</a:t>
+              <a:t>2/14/23</a:t>
             </a:fld>
             <a:endParaRPr lang="en-US"/>
           </a:p>
@@ -763,7 +763,7 @@
           <a:p>
             <a:fld id="{E384D03E-D0E3-7F45-A2BA-7784890EFA33}" type="datetimeFigureOut">
               <a:rPr lang="en-US" smtClean="0"/>
-              <a:t>10/27/22</a:t>
+              <a:t>2/14/23</a:t>
             </a:fld>
             <a:endParaRPr lang="en-US"/>
           </a:p>
@@ -1007,7 +1007,7 @@
           <a:p>
             <a:fld id="{E384D03E-D0E3-7F45-A2BA-7784890EFA33}" type="datetimeFigureOut">
               <a:rPr lang="en-US" smtClean="0"/>
-              <a:t>10/27/22</a:t>
+              <a:t>2/14/23</a:t>
             </a:fld>
             <a:endParaRPr lang="en-US"/>
           </a:p>
@@ -1239,7 +1239,7 @@
           <a:p>
             <a:fld id="{E384D03E-D0E3-7F45-A2BA-7784890EFA33}" type="datetimeFigureOut">
               <a:rPr lang="en-US" smtClean="0"/>
-              <a:t>10/27/22</a:t>
+              <a:t>2/14/23</a:t>
             </a:fld>
             <a:endParaRPr lang="en-US"/>
           </a:p>
@@ -1606,7 +1606,7 @@
           <a:p>
             <a:fld id="{E384D03E-D0E3-7F45-A2BA-7784890EFA33}" type="datetimeFigureOut">
               <a:rPr lang="en-US" smtClean="0"/>
-              <a:t>10/27/22</a:t>
+              <a:t>2/14/23</a:t>
             </a:fld>
             <a:endParaRPr lang="en-US"/>
           </a:p>
@@ -1724,7 +1724,7 @@
           <a:p>
             <a:fld id="{E384D03E-D0E3-7F45-A2BA-7784890EFA33}" type="datetimeFigureOut">
               <a:rPr lang="en-US" smtClean="0"/>
-              <a:t>10/27/22</a:t>
+              <a:t>2/14/23</a:t>
             </a:fld>
             <a:endParaRPr lang="en-US"/>
           </a:p>
@@ -1819,7 +1819,7 @@
           <a:p>
             <a:fld id="{E384D03E-D0E3-7F45-A2BA-7784890EFA33}" type="datetimeFigureOut">
               <a:rPr lang="en-US" smtClean="0"/>
-              <a:t>10/27/22</a:t>
+              <a:t>2/14/23</a:t>
             </a:fld>
             <a:endParaRPr lang="en-US"/>
           </a:p>
@@ -2096,7 +2096,7 @@
           <a:p>
             <a:fld id="{E384D03E-D0E3-7F45-A2BA-7784890EFA33}" type="datetimeFigureOut">
               <a:rPr lang="en-US" smtClean="0"/>
-              <a:t>10/27/22</a:t>
+              <a:t>2/14/23</a:t>
             </a:fld>
             <a:endParaRPr lang="en-US"/>
           </a:p>
@@ -2353,7 +2353,7 @@
           <a:p>
             <a:fld id="{E384D03E-D0E3-7F45-A2BA-7784890EFA33}" type="datetimeFigureOut">
               <a:rPr lang="en-US" smtClean="0"/>
-              <a:t>10/27/22</a:t>
+              <a:t>2/14/23</a:t>
             </a:fld>
             <a:endParaRPr lang="en-US"/>
           </a:p>
@@ -2566,7 +2566,7 @@
           <a:p>
             <a:fld id="{E384D03E-D0E3-7F45-A2BA-7784890EFA33}" type="datetimeFigureOut">
               <a:rPr lang="en-US" smtClean="0"/>
-              <a:t>10/27/22</a:t>
+              <a:t>2/14/23</a:t>
             </a:fld>
             <a:endParaRPr lang="en-US"/>
           </a:p>
@@ -3182,6 +3182,11 @@
           <a:p>
             <a:r>
               <a:rPr lang="en-US" sz="700" dirty="0" err="1">
+                <a:solidFill>
+                  <a:schemeClr val="accent5">
+                    <a:lumMod val="75000"/>
+                  </a:schemeClr>
+                </a:solidFill>
                 <a:latin typeface="Helvetica Light" panose="020B0403020202020204" pitchFamily="34" charset="0"/>
                 <a:ea typeface="Helvetica Light" charset="0"/>
                 <a:cs typeface="Helvetica Light" charset="0"/>
@@ -3189,6 +3194,11 @@
               <a:t>Kitimaat</a:t>
             </a:r>
             <a:endParaRPr lang="en-US" sz="600" dirty="0">
+              <a:solidFill>
+                <a:schemeClr val="accent5">
+                  <a:lumMod val="75000"/>
+                </a:schemeClr>
+              </a:solidFill>
               <a:latin typeface="Helvetica Light" panose="020B0403020202020204" pitchFamily="34" charset="0"/>
               <a:ea typeface="Helvetica Light" charset="0"/>
               <a:cs typeface="Helvetica Light" charset="0"/>
@@ -3520,6 +3530,11 @@
           <a:p>
             <a:r>
               <a:rPr lang="en-US" sz="700" dirty="0">
+                <a:solidFill>
+                  <a:schemeClr val="accent5">
+                    <a:lumMod val="75000"/>
+                  </a:schemeClr>
+                </a:solidFill>
                 <a:latin typeface="Helvetica Light" charset="0"/>
                 <a:ea typeface="Helvetica Light" charset="0"/>
                 <a:cs typeface="Helvetica Light" charset="0"/>
@@ -3527,6 +3542,11 @@
               <a:t>FIRS</a:t>
             </a:r>
             <a:endParaRPr lang="en-US" sz="600" dirty="0">
+              <a:solidFill>
+                <a:schemeClr val="accent5">
+                  <a:lumMod val="75000"/>
+                </a:schemeClr>
+              </a:solidFill>
               <a:latin typeface="Helvetica Light" charset="0"/>
               <a:ea typeface="Helvetica Light" charset="0"/>
               <a:cs typeface="Helvetica Light" charset="0"/>
@@ -3558,7 +3578,7 @@
           </a:prstGeom>
           <a:ln w="3175">
             <a:solidFill>
-              <a:schemeClr val="tx1"/>
+              <a:schemeClr val="accent1"/>
             </a:solidFill>
             <a:tailEnd type="stealth" w="sm" len="sm"/>
           </a:ln>
@@ -3602,7 +3622,7 @@
           </a:prstGeom>
           <a:ln w="3175">
             <a:solidFill>
-              <a:schemeClr val="tx1"/>
+              <a:schemeClr val="accent1"/>
             </a:solidFill>
             <a:tailEnd type="stealth" w="sm" len="sm"/>
           </a:ln>
@@ -3652,6 +3672,11 @@
           <a:p>
             <a:r>
               <a:rPr lang="en-US" sz="700" dirty="0">
+                <a:solidFill>
+                  <a:schemeClr val="accent5">
+                    <a:lumMod val="75000"/>
+                  </a:schemeClr>
+                </a:solidFill>
                 <a:latin typeface="Helvetica Light" charset="0"/>
                 <a:ea typeface="Helvetica Light" charset="0"/>
                 <a:cs typeface="Helvetica Light" charset="0"/>
@@ -3660,6 +3685,11 @@
             </a:r>
             <a:r>
               <a:rPr lang="en-US" sz="700" dirty="0" err="1">
+                <a:solidFill>
+                  <a:schemeClr val="accent5">
+                    <a:lumMod val="75000"/>
+                  </a:schemeClr>
+                </a:solidFill>
                 <a:latin typeface="Helvetica Light" charset="0"/>
                 <a:ea typeface="Helvetica Light" charset="0"/>
                 <a:cs typeface="Helvetica Light" charset="0"/>
@@ -3668,6 +3698,11 @@
             </a:r>
             <a:r>
               <a:rPr lang="en-US" sz="700" dirty="0">
+                <a:solidFill>
+                  <a:schemeClr val="accent5">
+                    <a:lumMod val="75000"/>
+                  </a:schemeClr>
+                </a:solidFill>
                 <a:latin typeface="Helvetica Light" charset="0"/>
                 <a:ea typeface="Helvetica Light" charset="0"/>
                 <a:cs typeface="Helvetica Light" charset="0"/>
@@ -3675,6 +3710,11 @@
               <a:t>)</a:t>
             </a:r>
             <a:endParaRPr lang="en-US" sz="600" dirty="0">
+              <a:solidFill>
+                <a:schemeClr val="accent5">
+                  <a:lumMod val="75000"/>
+                </a:schemeClr>
+              </a:solidFill>
               <a:latin typeface="Helvetica Light" charset="0"/>
               <a:ea typeface="Helvetica Light" charset="0"/>
               <a:cs typeface="Helvetica Light" charset="0"/>
@@ -3706,7 +3746,7 @@
           </a:prstGeom>
           <a:ln w="3175">
             <a:solidFill>
-              <a:schemeClr val="tx1"/>
+              <a:schemeClr val="accent1"/>
             </a:solidFill>
             <a:tailEnd type="stealth" w="sm" len="sm"/>
           </a:ln>
@@ -3757,6 +3797,11 @@
             <a:pPr algn="r"/>
             <a:r>
               <a:rPr lang="en-US" sz="700" dirty="0">
+                <a:solidFill>
+                  <a:schemeClr val="accent5">
+                    <a:lumMod val="75000"/>
+                  </a:schemeClr>
+                </a:solidFill>
                 <a:latin typeface="Helvetica Light" panose="020B0403020202020204" pitchFamily="34" charset="0"/>
                 <a:ea typeface="Helvetica Light" charset="0"/>
                 <a:cs typeface="Helvetica Light" charset="0"/>
@@ -3768,6 +3813,11 @@
             <a:pPr algn="r"/>
             <a:r>
               <a:rPr lang="en-US" sz="700" dirty="0">
+                <a:solidFill>
+                  <a:schemeClr val="accent5">
+                    <a:lumMod val="75000"/>
+                  </a:schemeClr>
+                </a:solidFill>
                 <a:latin typeface="Helvetica Light" panose="020B0403020202020204" pitchFamily="34" charset="0"/>
                 <a:ea typeface="Helvetica Light" charset="0"/>
                 <a:cs typeface="Helvetica Light" charset="0"/>
@@ -3775,6 +3825,11 @@
               <a:t>Kitimat</a:t>
             </a:r>
             <a:endParaRPr lang="en-US" sz="600" dirty="0">
+              <a:solidFill>
+                <a:schemeClr val="accent5">
+                  <a:lumMod val="75000"/>
+                </a:schemeClr>
+              </a:solidFill>
               <a:latin typeface="Helvetica Light" panose="020B0403020202020204" pitchFamily="34" charset="0"/>
               <a:ea typeface="Helvetica Light" charset="0"/>
               <a:cs typeface="Helvetica Light" charset="0"/>
@@ -6088,9 +6143,6 @@
               </a:rPr>
               <a:t>Canada</a:t>
             </a:r>
-            <a:endParaRPr lang="en-US" sz="700" dirty="0">
-              <a:latin typeface="Helvetica Light" panose="020B0403020202020204" pitchFamily="34" charset="0"/>
-            </a:endParaRPr>
           </a:p>
         </p:txBody>
       </p:sp>
@@ -6128,9 +6180,6 @@
               </a:rPr>
               <a:t>USA</a:t>
             </a:r>
-            <a:endParaRPr lang="en-US" sz="700" dirty="0">
-              <a:latin typeface="Helvetica Light" panose="020B0403020202020204" pitchFamily="34" charset="0"/>
-            </a:endParaRPr>
           </a:p>
         </p:txBody>
       </p:sp>
@@ -6168,9 +6217,6 @@
               </a:rPr>
               <a:t>AK</a:t>
             </a:r>
-            <a:endParaRPr lang="en-US" sz="700" dirty="0">
-              <a:latin typeface="Helvetica Light" panose="020B0403020202020204" pitchFamily="34" charset="0"/>
-            </a:endParaRPr>
           </a:p>
         </p:txBody>
       </p:sp>

</xml_diff>